<commit_message>
Intro R and Qualtrics ppt updates; expand on Qualtrics R coding file
</commit_message>
<xml_diff>
--- a/Automating LAVA Uploads with R/Automating Qualtrics Uploads to LAVA with R.pptx
+++ b/Automating LAVA Uploads with R/Automating Qualtrics Uploads to LAVA with R.pptx
@@ -116,6 +116,11 @@
       </a:defRPr>
     </a:lvl9pPr>
   </p:defaultTextStyle>
+  <p:extLst>
+    <p:ext uri="{EFAFB233-063F-42B5-8137-9DF3F51BA10A}">
+      <p15:sldGuideLst xmlns:p15="http://schemas.microsoft.com/office/powerpoint/2012/main"/>
+    </p:ext>
+  </p:extLst>
 </p:presentation>
 </file>
 
@@ -201,7 +206,7 @@
           <a:p>
             <a:fld id="{65A25266-E2FB-1543-9E02-780A1E631DAD}" type="datetimeFigureOut">
               <a:rPr lang="en-US" smtClean="0"/>
-              <a:t>6/9/20</a:t>
+              <a:t>6/10/20</a:t>
             </a:fld>
             <a:endParaRPr lang="en-US"/>
           </a:p>
@@ -986,6 +991,97 @@
 </p:notes>
 </file>
 
+<file path=ppt/notesSlides/notesSlide6.xml><?xml version="1.0" encoding="utf-8"?>
+<p:notes xmlns:a="http://schemas.openxmlformats.org/drawingml/2006/main" xmlns:r="http://schemas.openxmlformats.org/officeDocument/2006/relationships" xmlns:p="http://schemas.openxmlformats.org/presentationml/2006/main">
+  <p:cSld>
+    <p:spTree>
+      <p:nvGrpSpPr>
+        <p:cNvPr id="1" name=""/>
+        <p:cNvGrpSpPr/>
+        <p:nvPr/>
+      </p:nvGrpSpPr>
+      <p:grpSpPr>
+        <a:xfrm>
+          <a:off x="0" y="0"/>
+          <a:ext cx="0" cy="0"/>
+          <a:chOff x="0" y="0"/>
+          <a:chExt cx="0" cy="0"/>
+        </a:xfrm>
+      </p:grpSpPr>
+      <p:sp>
+        <p:nvSpPr>
+          <p:cNvPr id="2" name="Slide Image Placeholder 1"/>
+          <p:cNvSpPr>
+            <a:spLocks noGrp="1" noRot="1" noChangeAspect="1"/>
+          </p:cNvSpPr>
+          <p:nvPr>
+            <p:ph type="sldImg"/>
+          </p:nvPr>
+        </p:nvSpPr>
+        <p:spPr/>
+      </p:sp>
+      <p:sp>
+        <p:nvSpPr>
+          <p:cNvPr id="3" name="Notes Placeholder 2"/>
+          <p:cNvSpPr>
+            <a:spLocks noGrp="1"/>
+          </p:cNvSpPr>
+          <p:nvPr>
+            <p:ph type="body" idx="1"/>
+          </p:nvPr>
+        </p:nvSpPr>
+        <p:spPr/>
+        <p:txBody>
+          <a:bodyPr/>
+          <a:lstStyle/>
+          <a:p>
+            <a:pPr marL="171450" indent="-171450">
+              <a:buFont typeface="Arial" panose="020B0604020202020204" pitchFamily="34" charset="0"/>
+              <a:buChar char="•"/>
+            </a:pPr>
+            <a:r>
+              <a:rPr lang="en-US" dirty="0"/>
+              <a:t>For those familiar with HTTP requests, these are all just a bunch of GET requests</a:t>
+            </a:r>
+          </a:p>
+        </p:txBody>
+      </p:sp>
+      <p:sp>
+        <p:nvSpPr>
+          <p:cNvPr id="4" name="Slide Number Placeholder 3"/>
+          <p:cNvSpPr>
+            <a:spLocks noGrp="1"/>
+          </p:cNvSpPr>
+          <p:nvPr>
+            <p:ph type="sldNum" sz="quarter" idx="5"/>
+          </p:nvPr>
+        </p:nvSpPr>
+        <p:spPr/>
+        <p:txBody>
+          <a:bodyPr/>
+          <a:lstStyle/>
+          <a:p>
+            <a:fld id="{8A73554A-B8B3-9A40-9552-B7CA7BE8FDD9}" type="slidenum">
+              <a:rPr lang="en-US" smtClean="0"/>
+              <a:t>8</a:t>
+            </a:fld>
+            <a:endParaRPr lang="en-US"/>
+          </a:p>
+        </p:txBody>
+      </p:sp>
+    </p:spTree>
+    <p:extLst>
+      <p:ext uri="{BB962C8B-B14F-4D97-AF65-F5344CB8AC3E}">
+        <p14:creationId xmlns:p14="http://schemas.microsoft.com/office/powerpoint/2010/main" val="3869249640"/>
+      </p:ext>
+    </p:extLst>
+  </p:cSld>
+  <p:clrMapOvr>
+    <a:masterClrMapping/>
+  </p:clrMapOvr>
+</p:notes>
+</file>
+
 <file path=ppt/slideLayouts/slideLayout1.xml><?xml version="1.0" encoding="utf-8"?>
 <p:sldLayout xmlns:a="http://schemas.openxmlformats.org/drawingml/2006/main" xmlns:r="http://schemas.openxmlformats.org/officeDocument/2006/relationships" xmlns:p="http://schemas.openxmlformats.org/presentationml/2006/main" type="title" preserve="1">
   <p:cSld name="Title Slide">
@@ -2395,7 +2491,7 @@
           <a:p>
             <a:fld id="{4B1A9EA3-C6B4-A14C-BC60-5C63D5855CCA}" type="datetime1">
               <a:rPr lang="en-US" smtClean="0"/>
-              <a:t>6/4/20</a:t>
+              <a:t>6/10/20</a:t>
             </a:fld>
             <a:endParaRPr lang="en-US"/>
           </a:p>
@@ -3854,7 +3950,7 @@
           <a:p>
             <a:fld id="{55066249-6E65-484E-A2BC-73C9577940E8}" type="datetime1">
               <a:rPr lang="en-US" smtClean="0"/>
-              <a:t>6/4/20</a:t>
+              <a:t>6/10/20</a:t>
             </a:fld>
             <a:endParaRPr lang="en-US"/>
           </a:p>
@@ -5307,7 +5403,7 @@
           <a:p>
             <a:fld id="{965A30DB-088D-0845-A573-5EAEB1F5C074}" type="datetime1">
               <a:rPr lang="en-US" smtClean="0"/>
-              <a:t>6/4/20</a:t>
+              <a:t>6/10/20</a:t>
             </a:fld>
             <a:endParaRPr lang="en-US"/>
           </a:p>
@@ -6762,7 +6858,7 @@
           <a:p>
             <a:fld id="{4BE1179C-7D51-6A49-90BF-91499B561A26}" type="datetime1">
               <a:rPr lang="en-US" smtClean="0"/>
-              <a:t>6/4/20</a:t>
+              <a:t>6/10/20</a:t>
             </a:fld>
             <a:endParaRPr lang="en-US"/>
           </a:p>
@@ -8270,7 +8366,7 @@
           <a:p>
             <a:fld id="{8F8BD99A-3F77-F648-95A1-53550F6DDB06}" type="datetime1">
               <a:rPr lang="en-US" smtClean="0"/>
-              <a:t>6/4/20</a:t>
+              <a:t>6/10/20</a:t>
             </a:fld>
             <a:endParaRPr lang="en-US"/>
           </a:p>
@@ -9791,7 +9887,7 @@
           <a:p>
             <a:fld id="{13E47E9C-238A-8347-B25B-9809CEFE2065}" type="datetime1">
               <a:rPr lang="en-US" smtClean="0"/>
-              <a:t>6/4/20</a:t>
+              <a:t>6/10/20</a:t>
             </a:fld>
             <a:endParaRPr lang="en-US"/>
           </a:p>
@@ -11456,7 +11552,7 @@
           <a:p>
             <a:fld id="{C4974712-7150-B04B-BCC7-D7DF6751C66A}" type="datetime1">
               <a:rPr lang="en-US" smtClean="0"/>
-              <a:t>6/4/20</a:t>
+              <a:t>6/10/20</a:t>
             </a:fld>
             <a:endParaRPr lang="en-US"/>
           </a:p>
@@ -12854,7 +12950,7 @@
           <a:p>
             <a:fld id="{9BAAE3C6-0BEF-9A4F-8299-F60B683874C8}" type="datetime1">
               <a:rPr lang="en-US" smtClean="0"/>
-              <a:t>6/4/20</a:t>
+              <a:t>6/10/20</a:t>
             </a:fld>
             <a:endParaRPr lang="en-US"/>
           </a:p>
@@ -12954,7 +13050,7 @@
           <a:p>
             <a:fld id="{B3D10CAD-1DAB-564C-998F-FE7F920918A1}" type="datetime1">
               <a:rPr lang="en-US" smtClean="0"/>
-              <a:t>6/4/20</a:t>
+              <a:t>6/10/20</a:t>
             </a:fld>
             <a:endParaRPr lang="en-US"/>
           </a:p>
@@ -14480,7 +14576,7 @@
           <a:p>
             <a:fld id="{E508A6A3-1ACF-EF44-8470-7DC936ABC6E1}" type="datetime1">
               <a:rPr lang="en-US" smtClean="0"/>
-              <a:t>6/4/20</a:t>
+              <a:t>6/10/20</a:t>
             </a:fld>
             <a:endParaRPr lang="en-US"/>
           </a:p>
@@ -16016,7 +16112,7 @@
           <a:p>
             <a:fld id="{EB5BF775-EBFC-7F45-A667-D27F1E412E45}" type="datetime1">
               <a:rPr lang="en-US" smtClean="0"/>
-              <a:t>6/4/20</a:t>
+              <a:t>6/10/20</a:t>
             </a:fld>
             <a:endParaRPr lang="en-US"/>
           </a:p>
@@ -16239,7 +16335,7 @@
           <a:p>
             <a:fld id="{10AA680C-F319-2048-A701-5995EFE544F9}" type="datetime1">
               <a:rPr lang="en-US" smtClean="0"/>
-              <a:t>6/4/20</a:t>
+              <a:t>6/10/20</a:t>
             </a:fld>
             <a:endParaRPr lang="en-US"/>
           </a:p>
@@ -35184,7 +35280,7 @@
           <a:p>
             <a:r>
               <a:rPr lang="en-US" sz="2000" dirty="0"/>
-              <a:t>Perform other data cleaning</a:t>
+              <a:t>Perform other data cleaning as needed</a:t>
             </a:r>
           </a:p>
           <a:p>

</xml_diff>